<commit_message>
Versão final do poster
</commit_message>
<xml_diff>
--- a/modeloPosterTCC.pptx
+++ b/modeloPosterTCC.pptx
@@ -302,7 +302,7 @@
           <a:p>
             <a:fld id="{C63B6AA4-FDDF-4932-8D64-8DDD3840E557}" type="datetimeFigureOut">
               <a:rPr lang="pt-BR" smtClean="0"/>
-              <a:t>27/05/2018</a:t>
+              <a:t>30/05/2018</a:t>
             </a:fld>
             <a:endParaRPr lang="pt-BR"/>
           </a:p>
@@ -344,7 +344,7 @@
           <a:p>
             <a:fld id="{90EEF7E0-1267-4F84-A07D-BFC8BA0F6C91}" type="slidenum">
               <a:rPr lang="pt-BR" smtClean="0"/>
-              <a:t>‹nº›</a:t>
+              <a:t>‹#›</a:t>
             </a:fld>
             <a:endParaRPr lang="pt-BR"/>
           </a:p>
@@ -470,7 +470,7 @@
           <a:p>
             <a:fld id="{C63B6AA4-FDDF-4932-8D64-8DDD3840E557}" type="datetimeFigureOut">
               <a:rPr lang="pt-BR" smtClean="0"/>
-              <a:t>27/05/2018</a:t>
+              <a:t>30/05/2018</a:t>
             </a:fld>
             <a:endParaRPr lang="pt-BR"/>
           </a:p>
@@ -512,7 +512,7 @@
           <a:p>
             <a:fld id="{90EEF7E0-1267-4F84-A07D-BFC8BA0F6C91}" type="slidenum">
               <a:rPr lang="pt-BR" smtClean="0"/>
-              <a:t>‹nº›</a:t>
+              <a:t>‹#›</a:t>
             </a:fld>
             <a:endParaRPr lang="pt-BR"/>
           </a:p>
@@ -648,7 +648,7 @@
           <a:p>
             <a:fld id="{C63B6AA4-FDDF-4932-8D64-8DDD3840E557}" type="datetimeFigureOut">
               <a:rPr lang="pt-BR" smtClean="0"/>
-              <a:t>27/05/2018</a:t>
+              <a:t>30/05/2018</a:t>
             </a:fld>
             <a:endParaRPr lang="pt-BR"/>
           </a:p>
@@ -690,7 +690,7 @@
           <a:p>
             <a:fld id="{90EEF7E0-1267-4F84-A07D-BFC8BA0F6C91}" type="slidenum">
               <a:rPr lang="pt-BR" smtClean="0"/>
-              <a:t>‹nº›</a:t>
+              <a:t>‹#›</a:t>
             </a:fld>
             <a:endParaRPr lang="pt-BR"/>
           </a:p>
@@ -816,7 +816,7 @@
           <a:p>
             <a:fld id="{C63B6AA4-FDDF-4932-8D64-8DDD3840E557}" type="datetimeFigureOut">
               <a:rPr lang="pt-BR" smtClean="0"/>
-              <a:t>27/05/2018</a:t>
+              <a:t>30/05/2018</a:t>
             </a:fld>
             <a:endParaRPr lang="pt-BR"/>
           </a:p>
@@ -858,7 +858,7 @@
           <a:p>
             <a:fld id="{90EEF7E0-1267-4F84-A07D-BFC8BA0F6C91}" type="slidenum">
               <a:rPr lang="pt-BR" smtClean="0"/>
-              <a:t>‹nº›</a:t>
+              <a:t>‹#›</a:t>
             </a:fld>
             <a:endParaRPr lang="pt-BR"/>
           </a:p>
@@ -1061,7 +1061,7 @@
           <a:p>
             <a:fld id="{C63B6AA4-FDDF-4932-8D64-8DDD3840E557}" type="datetimeFigureOut">
               <a:rPr lang="pt-BR" smtClean="0"/>
-              <a:t>27/05/2018</a:t>
+              <a:t>30/05/2018</a:t>
             </a:fld>
             <a:endParaRPr lang="pt-BR"/>
           </a:p>
@@ -1103,7 +1103,7 @@
           <a:p>
             <a:fld id="{90EEF7E0-1267-4F84-A07D-BFC8BA0F6C91}" type="slidenum">
               <a:rPr lang="pt-BR" smtClean="0"/>
-              <a:t>‹nº›</a:t>
+              <a:t>‹#›</a:t>
             </a:fld>
             <a:endParaRPr lang="pt-BR"/>
           </a:p>
@@ -1346,7 +1346,7 @@
           <a:p>
             <a:fld id="{C63B6AA4-FDDF-4932-8D64-8DDD3840E557}" type="datetimeFigureOut">
               <a:rPr lang="pt-BR" smtClean="0"/>
-              <a:t>27/05/2018</a:t>
+              <a:t>30/05/2018</a:t>
             </a:fld>
             <a:endParaRPr lang="pt-BR"/>
           </a:p>
@@ -1388,7 +1388,7 @@
           <a:p>
             <a:fld id="{90EEF7E0-1267-4F84-A07D-BFC8BA0F6C91}" type="slidenum">
               <a:rPr lang="pt-BR" smtClean="0"/>
-              <a:t>‹nº›</a:t>
+              <a:t>‹#›</a:t>
             </a:fld>
             <a:endParaRPr lang="pt-BR"/>
           </a:p>
@@ -1765,7 +1765,7 @@
           <a:p>
             <a:fld id="{C63B6AA4-FDDF-4932-8D64-8DDD3840E557}" type="datetimeFigureOut">
               <a:rPr lang="pt-BR" smtClean="0"/>
-              <a:t>27/05/2018</a:t>
+              <a:t>30/05/2018</a:t>
             </a:fld>
             <a:endParaRPr lang="pt-BR"/>
           </a:p>
@@ -1807,7 +1807,7 @@
           <a:p>
             <a:fld id="{90EEF7E0-1267-4F84-A07D-BFC8BA0F6C91}" type="slidenum">
               <a:rPr lang="pt-BR" smtClean="0"/>
-              <a:t>‹nº›</a:t>
+              <a:t>‹#›</a:t>
             </a:fld>
             <a:endParaRPr lang="pt-BR"/>
           </a:p>
@@ -1882,7 +1882,7 @@
           <a:p>
             <a:fld id="{C63B6AA4-FDDF-4932-8D64-8DDD3840E557}" type="datetimeFigureOut">
               <a:rPr lang="pt-BR" smtClean="0"/>
-              <a:t>27/05/2018</a:t>
+              <a:t>30/05/2018</a:t>
             </a:fld>
             <a:endParaRPr lang="pt-BR"/>
           </a:p>
@@ -1924,7 +1924,7 @@
           <a:p>
             <a:fld id="{90EEF7E0-1267-4F84-A07D-BFC8BA0F6C91}" type="slidenum">
               <a:rPr lang="pt-BR" smtClean="0"/>
-              <a:t>‹nº›</a:t>
+              <a:t>‹#›</a:t>
             </a:fld>
             <a:endParaRPr lang="pt-BR"/>
           </a:p>
@@ -1977,7 +1977,7 @@
           <a:p>
             <a:fld id="{C63B6AA4-FDDF-4932-8D64-8DDD3840E557}" type="datetimeFigureOut">
               <a:rPr lang="pt-BR" smtClean="0"/>
-              <a:t>27/05/2018</a:t>
+              <a:t>30/05/2018</a:t>
             </a:fld>
             <a:endParaRPr lang="pt-BR"/>
           </a:p>
@@ -2019,7 +2019,7 @@
           <a:p>
             <a:fld id="{90EEF7E0-1267-4F84-A07D-BFC8BA0F6C91}" type="slidenum">
               <a:rPr lang="pt-BR" smtClean="0"/>
-              <a:t>‹nº›</a:t>
+              <a:t>‹#›</a:t>
             </a:fld>
             <a:endParaRPr lang="pt-BR"/>
           </a:p>
@@ -2252,7 +2252,7 @@
           <a:p>
             <a:fld id="{C63B6AA4-FDDF-4932-8D64-8DDD3840E557}" type="datetimeFigureOut">
               <a:rPr lang="pt-BR" smtClean="0"/>
-              <a:t>27/05/2018</a:t>
+              <a:t>30/05/2018</a:t>
             </a:fld>
             <a:endParaRPr lang="pt-BR"/>
           </a:p>
@@ -2294,7 +2294,7 @@
           <a:p>
             <a:fld id="{90EEF7E0-1267-4F84-A07D-BFC8BA0F6C91}" type="slidenum">
               <a:rPr lang="pt-BR" smtClean="0"/>
-              <a:t>‹nº›</a:t>
+              <a:t>‹#›</a:t>
             </a:fld>
             <a:endParaRPr lang="pt-BR"/>
           </a:p>
@@ -2504,7 +2504,7 @@
           <a:p>
             <a:fld id="{C63B6AA4-FDDF-4932-8D64-8DDD3840E557}" type="datetimeFigureOut">
               <a:rPr lang="pt-BR" smtClean="0"/>
-              <a:t>27/05/2018</a:t>
+              <a:t>30/05/2018</a:t>
             </a:fld>
             <a:endParaRPr lang="pt-BR"/>
           </a:p>
@@ -2546,7 +2546,7 @@
           <a:p>
             <a:fld id="{90EEF7E0-1267-4F84-A07D-BFC8BA0F6C91}" type="slidenum">
               <a:rPr lang="pt-BR" smtClean="0"/>
-              <a:t>‹nº›</a:t>
+              <a:t>‹#›</a:t>
             </a:fld>
             <a:endParaRPr lang="pt-BR"/>
           </a:p>
@@ -2715,7 +2715,7 @@
           <a:p>
             <a:fld id="{C63B6AA4-FDDF-4932-8D64-8DDD3840E557}" type="datetimeFigureOut">
               <a:rPr lang="pt-BR" smtClean="0"/>
-              <a:t>27/05/2018</a:t>
+              <a:t>30/05/2018</a:t>
             </a:fld>
             <a:endParaRPr lang="pt-BR"/>
           </a:p>
@@ -2793,7 +2793,7 @@
           <a:p>
             <a:fld id="{90EEF7E0-1267-4F84-A07D-BFC8BA0F6C91}" type="slidenum">
               <a:rPr lang="pt-BR" smtClean="0"/>
-              <a:t>‹nº›</a:t>
+              <a:t>‹#›</a:t>
             </a:fld>
             <a:endParaRPr lang="pt-BR"/>
           </a:p>
@@ -3121,8 +3121,8 @@
         </p:nvSpPr>
         <p:spPr>
           <a:xfrm>
-            <a:off x="2232109" y="576364"/>
-            <a:ext cx="24483059" cy="6264696"/>
+            <a:off x="2232109" y="720379"/>
+            <a:ext cx="24483059" cy="6461831"/>
           </a:xfrm>
           <a:ln>
             <a:noFill/>
@@ -3143,6 +3143,14 @@
               </a:rPr>
               <a:t>NO FAKE NEWS</a:t>
             </a:r>
+            <a:r>
+              <a:rPr lang="pt-BR" sz="8000" dirty="0">
+                <a:solidFill>
+                  <a:schemeClr val="bg1"/>
+                </a:solidFill>
+              </a:rPr>
+              <a:t/>
+            </a:r>
             <a:br>
               <a:rPr lang="pt-BR" sz="8000" dirty="0">
                 <a:solidFill>
@@ -3150,6 +3158,14 @@
                 </a:solidFill>
               </a:rPr>
             </a:br>
+            <a:r>
+              <a:rPr lang="pt-BR" sz="8000" dirty="0">
+                <a:solidFill>
+                  <a:schemeClr val="bg1"/>
+                </a:solidFill>
+              </a:rPr>
+              <a:t/>
+            </a:r>
             <a:br>
               <a:rPr lang="pt-BR" sz="8000" dirty="0">
                 <a:solidFill>
@@ -3166,13 +3182,28 @@
               <a:t>Validador de notícias utilizando </a:t>
             </a:r>
             <a:r>
-              <a:rPr lang="pt-BR" sz="8000" dirty="0" err="1">
+              <a:rPr lang="pt-BR" sz="8000" dirty="0" err="1" smtClean="0">
                 <a:solidFill>
                   <a:schemeClr val="bg1"/>
                 </a:solidFill>
               </a:rPr>
               <a:t>Blockchain</a:t>
             </a:r>
+            <a:r>
+              <a:rPr lang="pt-BR" sz="7200" dirty="0" smtClean="0">
+                <a:solidFill>
+                  <a:schemeClr val="bg1"/>
+                </a:solidFill>
+              </a:rPr>
+              <a:t/>
+            </a:r>
+            <a:br>
+              <a:rPr lang="pt-BR" sz="7200" dirty="0" smtClean="0">
+                <a:solidFill>
+                  <a:schemeClr val="bg1"/>
+                </a:solidFill>
+              </a:rPr>
+            </a:br>
             <a:endParaRPr lang="pt-BR" sz="8000" dirty="0">
               <a:solidFill>
                 <a:schemeClr val="bg1"/>
@@ -3191,7 +3222,7 @@
         </p:nvSpPr>
         <p:spPr>
           <a:xfrm>
-            <a:off x="792288" y="6985076"/>
+            <a:off x="900300" y="8040189"/>
             <a:ext cx="27003000" cy="6865767"/>
           </a:xfrm>
           <a:prstGeom prst="rect">
@@ -3225,13 +3256,13 @@
           <a:p>
             <a:pPr algn="just"/>
             <a:r>
-              <a:rPr lang="pt-BR" sz="7000" dirty="0">
+              <a:rPr lang="pt-BR" sz="7000" dirty="0" smtClean="0">
                 <a:solidFill>
                   <a:schemeClr val="bg1"/>
                 </a:solidFill>
                 <a:latin typeface="Calibri (Corpo)"/>
               </a:rPr>
-              <a:t>	A No </a:t>
+              <a:t>	No </a:t>
             </a:r>
             <a:r>
               <a:rPr lang="pt-BR" sz="7000" dirty="0" err="1">
@@ -3322,7 +3353,7 @@
           <p:cNvPr id="1026" name="Picture 2" descr="Resultado de imagem para pucrs logo png">
             <a:extLst>
               <a:ext uri="{FF2B5EF4-FFF2-40B4-BE49-F238E27FC236}">
-                <a16:creationId xmlns:a16="http://schemas.microsoft.com/office/drawing/2014/main" id="{38B86844-93EF-4B6B-A909-041485C29C51}"/>
+                <a16:creationId xmlns="" xmlns:a16="http://schemas.microsoft.com/office/drawing/2014/main" id="{38B86844-93EF-4B6B-A909-041485C29C51}"/>
               </a:ext>
             </a:extLst>
           </p:cNvPr>
@@ -3369,7 +3400,7 @@
           <p:cNvPr id="1028" name="Picture 4" descr="Resultado de imagem para facin logo png">
             <a:extLst>
               <a:ext uri="{FF2B5EF4-FFF2-40B4-BE49-F238E27FC236}">
-                <a16:creationId xmlns:a16="http://schemas.microsoft.com/office/drawing/2014/main" id="{1D8E694C-19E2-4169-BED5-76D60B5C0F8A}"/>
+                <a16:creationId xmlns="" xmlns:a16="http://schemas.microsoft.com/office/drawing/2014/main" id="{1D8E694C-19E2-4169-BED5-76D60B5C0F8A}"/>
               </a:ext>
             </a:extLst>
           </p:cNvPr>
@@ -3416,7 +3447,7 @@
           <p:cNvPr id="1030" name="Picture 6" descr="Resultado de imagem para blockchain png">
             <a:extLst>
               <a:ext uri="{FF2B5EF4-FFF2-40B4-BE49-F238E27FC236}">
-                <a16:creationId xmlns:a16="http://schemas.microsoft.com/office/drawing/2014/main" id="{91E22A9F-091B-4A0A-BEC3-1BE58BF05BFE}"/>
+                <a16:creationId xmlns="" xmlns:a16="http://schemas.microsoft.com/office/drawing/2014/main" id="{91E22A9F-091B-4A0A-BEC3-1BE58BF05BFE}"/>
               </a:ext>
             </a:extLst>
           </p:cNvPr>
@@ -3463,7 +3494,7 @@
           <p:cNvPr id="1032" name="Picture 8" descr="Resultado de imagem">
             <a:extLst>
               <a:ext uri="{FF2B5EF4-FFF2-40B4-BE49-F238E27FC236}">
-                <a16:creationId xmlns:a16="http://schemas.microsoft.com/office/drawing/2014/main" id="{D105A8B5-C208-45E9-8CE8-7BD9AB2B0CCA}"/>
+                <a16:creationId xmlns="" xmlns:a16="http://schemas.microsoft.com/office/drawing/2014/main" id="{D105A8B5-C208-45E9-8CE8-7BD9AB2B0CCA}"/>
               </a:ext>
             </a:extLst>
           </p:cNvPr>
@@ -3510,7 +3541,7 @@
           <p:cNvPr id="1034" name="Picture 10" descr="Resultado de imagem para npm">
             <a:extLst>
               <a:ext uri="{FF2B5EF4-FFF2-40B4-BE49-F238E27FC236}">
-                <a16:creationId xmlns:a16="http://schemas.microsoft.com/office/drawing/2014/main" id="{22BF4E21-431B-49F2-AF0F-701B8D0B54A3}"/>
+                <a16:creationId xmlns="" xmlns:a16="http://schemas.microsoft.com/office/drawing/2014/main" id="{22BF4E21-431B-49F2-AF0F-701B8D0B54A3}"/>
               </a:ext>
             </a:extLst>
           </p:cNvPr>
@@ -3557,7 +3588,7 @@
           <p:cNvPr id="1036" name="Picture 12" descr="Resultado de imagem para hyperledger">
             <a:extLst>
               <a:ext uri="{FF2B5EF4-FFF2-40B4-BE49-F238E27FC236}">
-                <a16:creationId xmlns:a16="http://schemas.microsoft.com/office/drawing/2014/main" id="{B1C1A4CF-8007-49D9-8946-43756E1350F3}"/>
+                <a16:creationId xmlns="" xmlns:a16="http://schemas.microsoft.com/office/drawing/2014/main" id="{B1C1A4CF-8007-49D9-8946-43756E1350F3}"/>
               </a:ext>
             </a:extLst>
           </p:cNvPr>
@@ -3604,7 +3635,7 @@
           <p:cNvPr id="1038" name="Picture 14" descr="Resultado de imagem para docker png">
             <a:extLst>
               <a:ext uri="{FF2B5EF4-FFF2-40B4-BE49-F238E27FC236}">
-                <a16:creationId xmlns:a16="http://schemas.microsoft.com/office/drawing/2014/main" id="{7E5AF0DB-DF02-4CA7-B60C-A69FBAB5E6FA}"/>
+                <a16:creationId xmlns="" xmlns:a16="http://schemas.microsoft.com/office/drawing/2014/main" id="{7E5AF0DB-DF02-4CA7-B60C-A69FBAB5E6FA}"/>
               </a:ext>
             </a:extLst>
           </p:cNvPr>
@@ -3651,7 +3682,7 @@
           <p:cNvPr id="1040" name="Picture 16" descr="Resultado de imagem para hyperledger composer logo">
             <a:extLst>
               <a:ext uri="{FF2B5EF4-FFF2-40B4-BE49-F238E27FC236}">
-                <a16:creationId xmlns:a16="http://schemas.microsoft.com/office/drawing/2014/main" id="{EE1E269B-174A-4AD9-B5FD-EC99581801A2}"/>
+                <a16:creationId xmlns="" xmlns:a16="http://schemas.microsoft.com/office/drawing/2014/main" id="{EE1E269B-174A-4AD9-B5FD-EC99581801A2}"/>
               </a:ext>
             </a:extLst>
           </p:cNvPr>
@@ -3698,7 +3729,7 @@
           <p:cNvPr id="3" name="CaixaDeTexto 2">
             <a:extLst>
               <a:ext uri="{FF2B5EF4-FFF2-40B4-BE49-F238E27FC236}">
-                <a16:creationId xmlns:a16="http://schemas.microsoft.com/office/drawing/2014/main" id="{E79336E1-AD6C-4B4F-9D46-D934E247F3BA}"/>
+                <a16:creationId xmlns="" xmlns:a16="http://schemas.microsoft.com/office/drawing/2014/main" id="{E79336E1-AD6C-4B4F-9D46-D934E247F3BA}"/>
               </a:ext>
             </a:extLst>
           </p:cNvPr>
@@ -3707,7 +3738,7 @@
         </p:nvSpPr>
         <p:spPr>
           <a:xfrm>
-            <a:off x="14305848" y="19442449"/>
+            <a:off x="14305848" y="22178753"/>
             <a:ext cx="13393488" cy="7632859"/>
           </a:xfrm>
           <a:prstGeom prst="rect">
@@ -3781,7 +3812,7 @@
           <p:cNvPr id="53" name="Picture 2" descr="Resultado de imagem para stick man png">
             <a:extLst>
               <a:ext uri="{FF2B5EF4-FFF2-40B4-BE49-F238E27FC236}">
-                <a16:creationId xmlns:a16="http://schemas.microsoft.com/office/drawing/2014/main" id="{2ECBEFE5-5297-4B78-8A57-475C453BF114}"/>
+                <a16:creationId xmlns="" xmlns:a16="http://schemas.microsoft.com/office/drawing/2014/main" id="{2ECBEFE5-5297-4B78-8A57-475C453BF114}"/>
               </a:ext>
             </a:extLst>
           </p:cNvPr>
@@ -3805,7 +3836,7 @@
         </p:blipFill>
         <p:spPr bwMode="auto">
           <a:xfrm>
-            <a:off x="6652169" y="19326319"/>
+            <a:off x="6446938" y="21187410"/>
             <a:ext cx="1131585" cy="1135370"/>
           </a:xfrm>
           <a:prstGeom prst="rect">
@@ -3828,7 +3859,7 @@
           <p:cNvPr id="54" name="Picture 2" descr="Resultado de imagem para stick man png">
             <a:extLst>
               <a:ext uri="{FF2B5EF4-FFF2-40B4-BE49-F238E27FC236}">
-                <a16:creationId xmlns:a16="http://schemas.microsoft.com/office/drawing/2014/main" id="{AF6A9816-FD42-472C-A389-B44E43990BEA}"/>
+                <a16:creationId xmlns="" xmlns:a16="http://schemas.microsoft.com/office/drawing/2014/main" id="{AF6A9816-FD42-472C-A389-B44E43990BEA}"/>
               </a:ext>
             </a:extLst>
           </p:cNvPr>
@@ -3852,7 +3883,7 @@
         </p:blipFill>
         <p:spPr bwMode="auto">
           <a:xfrm>
-            <a:off x="6652169" y="24545467"/>
+            <a:off x="6446938" y="28964274"/>
             <a:ext cx="1131585" cy="1135370"/>
           </a:xfrm>
           <a:prstGeom prst="rect">
@@ -3875,7 +3906,7 @@
           <p:cNvPr id="55" name="Conector reto 54">
             <a:extLst>
               <a:ext uri="{FF2B5EF4-FFF2-40B4-BE49-F238E27FC236}">
-                <a16:creationId xmlns:a16="http://schemas.microsoft.com/office/drawing/2014/main" id="{E4137AB5-B77F-436F-BF95-82093D3B599A}"/>
+                <a16:creationId xmlns="" xmlns:a16="http://schemas.microsoft.com/office/drawing/2014/main" id="{E4137AB5-B77F-436F-BF95-82093D3B599A}"/>
               </a:ext>
             </a:extLst>
           </p:cNvPr>
@@ -3888,8 +3919,8 @@
         </p:nvCxnSpPr>
         <p:spPr>
           <a:xfrm>
-            <a:off x="7217962" y="20461689"/>
-            <a:ext cx="0" cy="4083778"/>
+            <a:off x="7012731" y="22322780"/>
+            <a:ext cx="0" cy="6641494"/>
           </a:xfrm>
           <a:prstGeom prst="line">
             <a:avLst/>
@@ -3920,7 +3951,7 @@
           <p:cNvPr id="56" name="Picture 2" descr="Resultado de imagem para stick man png">
             <a:extLst>
               <a:ext uri="{FF2B5EF4-FFF2-40B4-BE49-F238E27FC236}">
-                <a16:creationId xmlns:a16="http://schemas.microsoft.com/office/drawing/2014/main" id="{8623B9B5-15AC-48C8-B660-22122A71E63A}"/>
+                <a16:creationId xmlns="" xmlns:a16="http://schemas.microsoft.com/office/drawing/2014/main" id="{8623B9B5-15AC-48C8-B660-22122A71E63A}"/>
               </a:ext>
             </a:extLst>
           </p:cNvPr>
@@ -3944,7 +3975,7 @@
         </p:blipFill>
         <p:spPr bwMode="auto">
           <a:xfrm>
-            <a:off x="12170229" y="21934593"/>
+            <a:off x="11964998" y="25095823"/>
             <a:ext cx="1131585" cy="1135370"/>
           </a:xfrm>
           <a:prstGeom prst="rect">
@@ -3967,7 +3998,7 @@
           <p:cNvPr id="57" name="Picture 2" descr="Resultado de imagem para stick man png">
             <a:extLst>
               <a:ext uri="{FF2B5EF4-FFF2-40B4-BE49-F238E27FC236}">
-                <a16:creationId xmlns:a16="http://schemas.microsoft.com/office/drawing/2014/main" id="{B4D3D894-DDC1-480F-A6CE-627673E66187}"/>
+                <a16:creationId xmlns="" xmlns:a16="http://schemas.microsoft.com/office/drawing/2014/main" id="{B4D3D894-DDC1-480F-A6CE-627673E66187}"/>
               </a:ext>
             </a:extLst>
           </p:cNvPr>
@@ -3991,7 +4022,7 @@
         </p:blipFill>
         <p:spPr bwMode="auto">
           <a:xfrm>
-            <a:off x="1121962" y="21937192"/>
+            <a:off x="916731" y="25098422"/>
             <a:ext cx="1131585" cy="1135370"/>
           </a:xfrm>
           <a:prstGeom prst="rect">
@@ -4014,7 +4045,7 @@
           <p:cNvPr id="58" name="Conector reto 57">
             <a:extLst>
               <a:ext uri="{FF2B5EF4-FFF2-40B4-BE49-F238E27FC236}">
-                <a16:creationId xmlns:a16="http://schemas.microsoft.com/office/drawing/2014/main" id="{70B13C0E-FF4D-466F-A085-8E48333ADB2E}"/>
+                <a16:creationId xmlns="" xmlns:a16="http://schemas.microsoft.com/office/drawing/2014/main" id="{70B13C0E-FF4D-466F-A085-8E48333ADB2E}"/>
               </a:ext>
             </a:extLst>
           </p:cNvPr>
@@ -4027,7 +4058,7 @@
         </p:nvCxnSpPr>
         <p:spPr>
           <a:xfrm flipH="1">
-            <a:off x="2253547" y="22502278"/>
+            <a:off x="2048316" y="25663508"/>
             <a:ext cx="9916682" cy="2599"/>
           </a:xfrm>
           <a:prstGeom prst="line">
@@ -4059,7 +4090,7 @@
           <p:cNvPr id="59" name="Picture 2" descr="Resultado de imagem para stick man png">
             <a:extLst>
               <a:ext uri="{FF2B5EF4-FFF2-40B4-BE49-F238E27FC236}">
-                <a16:creationId xmlns:a16="http://schemas.microsoft.com/office/drawing/2014/main" id="{4D491D7B-65F0-4920-9E60-C4D1AB97C8BD}"/>
+                <a16:creationId xmlns="" xmlns:a16="http://schemas.microsoft.com/office/drawing/2014/main" id="{4D491D7B-65F0-4920-9E60-C4D1AB97C8BD}"/>
               </a:ext>
             </a:extLst>
           </p:cNvPr>
@@ -4083,7 +4114,7 @@
         </p:blipFill>
         <p:spPr bwMode="auto">
           <a:xfrm>
-            <a:off x="12164436" y="24542868"/>
+            <a:off x="11959205" y="28961675"/>
             <a:ext cx="1131585" cy="1135370"/>
           </a:xfrm>
           <a:prstGeom prst="rect">
@@ -4106,7 +4137,7 @@
           <p:cNvPr id="60" name="Picture 2" descr="Resultado de imagem para stick man png">
             <a:extLst>
               <a:ext uri="{FF2B5EF4-FFF2-40B4-BE49-F238E27FC236}">
-                <a16:creationId xmlns:a16="http://schemas.microsoft.com/office/drawing/2014/main" id="{CD8E3783-6F38-4A47-BE90-2735F58B952A}"/>
+                <a16:creationId xmlns="" xmlns:a16="http://schemas.microsoft.com/office/drawing/2014/main" id="{CD8E3783-6F38-4A47-BE90-2735F58B952A}"/>
               </a:ext>
             </a:extLst>
           </p:cNvPr>
@@ -4130,7 +4161,7 @@
         </p:blipFill>
         <p:spPr bwMode="auto">
           <a:xfrm>
-            <a:off x="1131898" y="19326319"/>
+            <a:off x="926667" y="21187410"/>
             <a:ext cx="1131585" cy="1135370"/>
           </a:xfrm>
           <a:prstGeom prst="rect">
@@ -4153,7 +4184,7 @@
           <p:cNvPr id="61" name="Conector reto 60">
             <a:extLst>
               <a:ext uri="{FF2B5EF4-FFF2-40B4-BE49-F238E27FC236}">
-                <a16:creationId xmlns:a16="http://schemas.microsoft.com/office/drawing/2014/main" id="{684242AD-2199-46E4-AAE5-B8F39F8F39BE}"/>
+                <a16:creationId xmlns="" xmlns:a16="http://schemas.microsoft.com/office/drawing/2014/main" id="{684242AD-2199-46E4-AAE5-B8F39F8F39BE}"/>
               </a:ext>
             </a:extLst>
           </p:cNvPr>
@@ -4166,8 +4197,8 @@
         </p:nvCxnSpPr>
         <p:spPr>
           <a:xfrm flipH="1" flipV="1">
-            <a:off x="2263483" y="19894004"/>
-            <a:ext cx="9900953" cy="5216549"/>
+            <a:off x="2058252" y="21755095"/>
+            <a:ext cx="9900953" cy="7774265"/>
           </a:xfrm>
           <a:prstGeom prst="line">
             <a:avLst/>
@@ -4198,7 +4229,7 @@
           <p:cNvPr id="62" name="Picture 2" descr="Resultado de imagem para stick man png">
             <a:extLst>
               <a:ext uri="{FF2B5EF4-FFF2-40B4-BE49-F238E27FC236}">
-                <a16:creationId xmlns:a16="http://schemas.microsoft.com/office/drawing/2014/main" id="{4958E8C2-9328-4E24-8BBF-F4DF4D4A4251}"/>
+                <a16:creationId xmlns="" xmlns:a16="http://schemas.microsoft.com/office/drawing/2014/main" id="{4958E8C2-9328-4E24-8BBF-F4DF4D4A4251}"/>
               </a:ext>
             </a:extLst>
           </p:cNvPr>
@@ -4222,7 +4253,7 @@
         </p:blipFill>
         <p:spPr bwMode="auto">
           <a:xfrm>
-            <a:off x="12173386" y="19323719"/>
+            <a:off x="11968155" y="21184810"/>
             <a:ext cx="1131585" cy="1135370"/>
           </a:xfrm>
           <a:prstGeom prst="rect">
@@ -4245,7 +4276,7 @@
           <p:cNvPr id="63" name="Picture 2" descr="Resultado de imagem para stick man png">
             <a:extLst>
               <a:ext uri="{FF2B5EF4-FFF2-40B4-BE49-F238E27FC236}">
-                <a16:creationId xmlns:a16="http://schemas.microsoft.com/office/drawing/2014/main" id="{1F896FC9-0BB8-4481-B19E-02165BC4C840}"/>
+                <a16:creationId xmlns="" xmlns:a16="http://schemas.microsoft.com/office/drawing/2014/main" id="{1F896FC9-0BB8-4481-B19E-02165BC4C840}"/>
               </a:ext>
             </a:extLst>
           </p:cNvPr>
@@ -4269,7 +4300,7 @@
         </p:blipFill>
         <p:spPr bwMode="auto">
           <a:xfrm>
-            <a:off x="1130953" y="24542868"/>
+            <a:off x="925722" y="28961675"/>
             <a:ext cx="1131585" cy="1135370"/>
           </a:xfrm>
           <a:prstGeom prst="rect">
@@ -4292,7 +4323,7 @@
           <p:cNvPr id="64" name="Conector reto 63">
             <a:extLst>
               <a:ext uri="{FF2B5EF4-FFF2-40B4-BE49-F238E27FC236}">
-                <a16:creationId xmlns:a16="http://schemas.microsoft.com/office/drawing/2014/main" id="{7C9C692A-E296-4C6E-8B2A-1647F8B6A02E}"/>
+                <a16:creationId xmlns="" xmlns:a16="http://schemas.microsoft.com/office/drawing/2014/main" id="{7C9C692A-E296-4C6E-8B2A-1647F8B6A02E}"/>
               </a:ext>
             </a:extLst>
           </p:cNvPr>
@@ -4305,8 +4336,8 @@
         </p:nvCxnSpPr>
         <p:spPr>
           <a:xfrm flipH="1">
-            <a:off x="2262538" y="19891404"/>
-            <a:ext cx="9910848" cy="5219149"/>
+            <a:off x="2057307" y="21752495"/>
+            <a:ext cx="9910848" cy="7776865"/>
           </a:xfrm>
           <a:prstGeom prst="line">
             <a:avLst/>
@@ -4337,7 +4368,7 @@
           <p:cNvPr id="65" name="Imagem 64">
             <a:extLst>
               <a:ext uri="{FF2B5EF4-FFF2-40B4-BE49-F238E27FC236}">
-                <a16:creationId xmlns:a16="http://schemas.microsoft.com/office/drawing/2014/main" id="{81CFC644-76BC-43CD-AB33-F71242ACEEE3}"/>
+                <a16:creationId xmlns="" xmlns:a16="http://schemas.microsoft.com/office/drawing/2014/main" id="{81CFC644-76BC-43CD-AB33-F71242ACEEE3}"/>
               </a:ext>
             </a:extLst>
           </p:cNvPr>
@@ -4354,8 +4385,8 @@
         </p:blipFill>
         <p:spPr>
           <a:xfrm>
-            <a:off x="2640841" y="20907896"/>
-            <a:ext cx="9157446" cy="3031200"/>
+            <a:off x="792288" y="23447613"/>
+            <a:ext cx="12482280" cy="4131751"/>
           </a:xfrm>
           <a:prstGeom prst="rect">
             <a:avLst/>
@@ -4372,7 +4403,7 @@
           <p:cNvPr id="5" name="CaixaDeTexto 4">
             <a:extLst>
               <a:ext uri="{FF2B5EF4-FFF2-40B4-BE49-F238E27FC236}">
-                <a16:creationId xmlns:a16="http://schemas.microsoft.com/office/drawing/2014/main" id="{8B532E59-A943-473C-A1CC-DE96ED310C40}"/>
+                <a16:creationId xmlns="" xmlns:a16="http://schemas.microsoft.com/office/drawing/2014/main" id="{8B532E59-A943-473C-A1CC-DE96ED310C40}"/>
               </a:ext>
             </a:extLst>
           </p:cNvPr>
@@ -4381,8 +4412,8 @@
         </p:nvSpPr>
         <p:spPr>
           <a:xfrm>
-            <a:off x="902957" y="12745716"/>
-            <a:ext cx="13297535" cy="6555641"/>
+            <a:off x="902957" y="14329881"/>
+            <a:ext cx="12919539" cy="7632859"/>
           </a:xfrm>
           <a:prstGeom prst="rect">
             <a:avLst/>
@@ -4432,7 +4463,7 @@
           <p:cNvPr id="7" name="CaixaDeTexto 6">
             <a:extLst>
               <a:ext uri="{FF2B5EF4-FFF2-40B4-BE49-F238E27FC236}">
-                <a16:creationId xmlns:a16="http://schemas.microsoft.com/office/drawing/2014/main" id="{6A7BE760-3B86-4912-8113-6843F0C2E929}"/>
+                <a16:creationId xmlns="" xmlns:a16="http://schemas.microsoft.com/office/drawing/2014/main" id="{6A7BE760-3B86-4912-8113-6843F0C2E929}"/>
               </a:ext>
             </a:extLst>
           </p:cNvPr>
@@ -4441,8 +4472,8 @@
         </p:nvSpPr>
         <p:spPr>
           <a:xfrm>
-            <a:off x="898747" y="27126319"/>
-            <a:ext cx="13503053" cy="7632859"/>
+            <a:off x="898747" y="30955023"/>
+            <a:ext cx="26800589" cy="4401205"/>
           </a:xfrm>
           <a:prstGeom prst="rect">
             <a:avLst/>
@@ -4492,7 +4523,7 @@
           <p:cNvPr id="10" name="Imagem 9">
             <a:extLst>
               <a:ext uri="{FF2B5EF4-FFF2-40B4-BE49-F238E27FC236}">
-                <a16:creationId xmlns:a16="http://schemas.microsoft.com/office/drawing/2014/main" id="{1F6D1FE5-C952-4277-B178-94EDB7449F8A}"/>
+                <a16:creationId xmlns="" xmlns:a16="http://schemas.microsoft.com/office/drawing/2014/main" id="{1F6D1FE5-C952-4277-B178-94EDB7449F8A}"/>
               </a:ext>
             </a:extLst>
           </p:cNvPr>
@@ -4509,14 +4540,96 @@
         </p:blipFill>
         <p:spPr>
           <a:xfrm>
-            <a:off x="15625936" y="12713159"/>
-            <a:ext cx="11159891" cy="5832648"/>
+            <a:off x="14305848" y="13811224"/>
+            <a:ext cx="13392272" cy="6999388"/>
           </a:xfrm>
           <a:prstGeom prst="rect">
             <a:avLst/>
           </a:prstGeom>
         </p:spPr>
       </p:pic>
+      <p:sp>
+        <p:nvSpPr>
+          <p:cNvPr id="6" name="TextBox 5"/>
+          <p:cNvSpPr txBox="1"/>
+          <p:nvPr/>
+        </p:nvSpPr>
+        <p:spPr>
+          <a:xfrm>
+            <a:off x="8134605" y="5869064"/>
+            <a:ext cx="12463925" cy="1446550"/>
+          </a:xfrm>
+          <a:prstGeom prst="rect">
+            <a:avLst/>
+          </a:prstGeom>
+          <a:noFill/>
+        </p:spPr>
+        <p:txBody>
+          <a:bodyPr wrap="none" rtlCol="0">
+            <a:spAutoFit/>
+          </a:bodyPr>
+          <a:lstStyle/>
+          <a:p>
+            <a:pPr algn="ctr"/>
+            <a:r>
+              <a:rPr lang="pt-BR" b="1" dirty="0" smtClean="0">
+                <a:solidFill>
+                  <a:schemeClr val="bg1"/>
+                </a:solidFill>
+              </a:rPr>
+              <a:t>Nomes:</a:t>
+            </a:r>
+            <a:r>
+              <a:rPr lang="pt-BR" dirty="0" smtClean="0">
+                <a:solidFill>
+                  <a:schemeClr val="bg1"/>
+                </a:solidFill>
+              </a:rPr>
+              <a:t> Marlon Silva da Fontoura, Murilo Castro Neto</a:t>
+            </a:r>
+            <a:br>
+              <a:rPr lang="pt-BR" dirty="0" smtClean="0">
+                <a:solidFill>
+                  <a:schemeClr val="bg1"/>
+                </a:solidFill>
+              </a:rPr>
+            </a:br>
+            <a:r>
+              <a:rPr lang="pt-BR" b="1" dirty="0" smtClean="0">
+                <a:solidFill>
+                  <a:schemeClr val="bg1"/>
+                </a:solidFill>
+              </a:rPr>
+              <a:t>Orientador</a:t>
+            </a:r>
+            <a:r>
+              <a:rPr lang="pt-BR" b="1" dirty="0">
+                <a:solidFill>
+                  <a:schemeClr val="bg1"/>
+                </a:solidFill>
+              </a:rPr>
+              <a:t>:</a:t>
+            </a:r>
+            <a:r>
+              <a:rPr lang="pt-BR" dirty="0">
+                <a:solidFill>
+                  <a:schemeClr val="bg1"/>
+                </a:solidFill>
+              </a:rPr>
+              <a:t> Avelino Francisco </a:t>
+            </a:r>
+            <a:r>
+              <a:rPr lang="pt-BR" dirty="0" err="1">
+                <a:solidFill>
+                  <a:schemeClr val="bg1"/>
+                </a:solidFill>
+              </a:rPr>
+              <a:t>Zorzo</a:t>
+            </a:r>
+            <a:endParaRPr lang="en-GB" dirty="0"/>
+          </a:p>
+        </p:txBody>
+      </p:sp>
     </p:spTree>
     <p:extLst>
       <p:ext uri="{BB962C8B-B14F-4D97-AF65-F5344CB8AC3E}">

</xml_diff>